<commit_message>
Add today's problem and update yesterday's problem
</commit_message>
<xml_diff>
--- a/2023/2023-03/2023-03-26/problem.pptx
+++ b/2023/2023-03/2023-03-26/problem.pptx
@@ -446,7 +446,7 @@
           <a:p>
             <a:fld id="{13CAB402-B863-4AA4-B7CA-C5BADD25EDE0}" type="datetimeFigureOut">
               <a:rPr lang="en-US" smtClean="0"/>
-              <a:t>3/26/2023</a:t>
+              <a:t>3/27/2023</a:t>
             </a:fld>
             <a:endParaRPr lang="en-US"/>
           </a:p>
@@ -770,7 +770,7 @@
           <a:p>
             <a:fld id="{13CAB402-B863-4AA4-B7CA-C5BADD25EDE0}" type="datetimeFigureOut">
               <a:rPr lang="en-US" smtClean="0"/>
-              <a:t>3/26/2023</a:t>
+              <a:t>3/27/2023</a:t>
             </a:fld>
             <a:endParaRPr lang="en-US"/>
           </a:p>
@@ -1018,7 +1018,7 @@
           <a:p>
             <a:fld id="{13CAB402-B863-4AA4-B7CA-C5BADD25EDE0}" type="datetimeFigureOut">
               <a:rPr lang="en-US" smtClean="0"/>
-              <a:t>3/26/2023</a:t>
+              <a:t>3/27/2023</a:t>
             </a:fld>
             <a:endParaRPr lang="en-US"/>
           </a:p>
@@ -1357,7 +1357,7 @@
           <a:p>
             <a:fld id="{13CAB402-B863-4AA4-B7CA-C5BADD25EDE0}" type="datetimeFigureOut">
               <a:rPr lang="en-US" smtClean="0"/>
-              <a:t>3/26/2023</a:t>
+              <a:t>3/27/2023</a:t>
             </a:fld>
             <a:endParaRPr lang="en-US"/>
           </a:p>
@@ -1704,7 +1704,7 @@
           <a:p>
             <a:fld id="{13CAB402-B863-4AA4-B7CA-C5BADD25EDE0}" type="datetimeFigureOut">
               <a:rPr lang="en-US" smtClean="0"/>
-              <a:t>3/26/2023</a:t>
+              <a:t>3/27/2023</a:t>
             </a:fld>
             <a:endParaRPr lang="en-US"/>
           </a:p>
@@ -2078,7 +2078,7 @@
           <a:p>
             <a:fld id="{13CAB402-B863-4AA4-B7CA-C5BADD25EDE0}" type="datetimeFigureOut">
               <a:rPr lang="en-US" smtClean="0"/>
-              <a:t>3/26/2023</a:t>
+              <a:t>3/27/2023</a:t>
             </a:fld>
             <a:endParaRPr lang="en-US"/>
           </a:p>
@@ -2548,7 +2548,7 @@
           <a:p>
             <a:fld id="{13CAB402-B863-4AA4-B7CA-C5BADD25EDE0}" type="datetimeFigureOut">
               <a:rPr lang="en-US" smtClean="0"/>
-              <a:t>3/26/2023</a:t>
+              <a:t>3/27/2023</a:t>
             </a:fld>
             <a:endParaRPr lang="en-US"/>
           </a:p>
@@ -2753,7 +2753,7 @@
           <a:p>
             <a:fld id="{13CAB402-B863-4AA4-B7CA-C5BADD25EDE0}" type="datetimeFigureOut">
               <a:rPr lang="en-US" smtClean="0"/>
-              <a:t>3/26/2023</a:t>
+              <a:t>3/27/2023</a:t>
             </a:fld>
             <a:endParaRPr lang="en-US"/>
           </a:p>
@@ -2964,7 +2964,7 @@
           <a:p>
             <a:fld id="{13CAB402-B863-4AA4-B7CA-C5BADD25EDE0}" type="datetimeFigureOut">
               <a:rPr lang="en-US" smtClean="0"/>
-              <a:t>3/26/2023</a:t>
+              <a:t>3/27/2023</a:t>
             </a:fld>
             <a:endParaRPr lang="en-US"/>
           </a:p>
@@ -3196,7 +3196,7 @@
           <a:p>
             <a:fld id="{13CAB402-B863-4AA4-B7CA-C5BADD25EDE0}" type="datetimeFigureOut">
               <a:rPr lang="en-US" smtClean="0"/>
-              <a:t>3/26/2023</a:t>
+              <a:t>3/27/2023</a:t>
             </a:fld>
             <a:endParaRPr lang="en-US"/>
           </a:p>
@@ -3444,7 +3444,7 @@
           <a:p>
             <a:fld id="{13CAB402-B863-4AA4-B7CA-C5BADD25EDE0}" type="datetimeFigureOut">
               <a:rPr lang="en-US" smtClean="0"/>
-              <a:t>3/26/2023</a:t>
+              <a:t>3/27/2023</a:t>
             </a:fld>
             <a:endParaRPr lang="en-US"/>
           </a:p>
@@ -3742,7 +3742,7 @@
           <a:p>
             <a:fld id="{13CAB402-B863-4AA4-B7CA-C5BADD25EDE0}" type="datetimeFigureOut">
               <a:rPr lang="en-US" smtClean="0"/>
-              <a:t>3/26/2023</a:t>
+              <a:t>3/27/2023</a:t>
             </a:fld>
             <a:endParaRPr lang="en-US"/>
           </a:p>
@@ -4136,7 +4136,7 @@
           <a:p>
             <a:fld id="{13CAB402-B863-4AA4-B7CA-C5BADD25EDE0}" type="datetimeFigureOut">
               <a:rPr lang="en-US" smtClean="0"/>
-              <a:t>3/26/2023</a:t>
+              <a:t>3/27/2023</a:t>
             </a:fld>
             <a:endParaRPr lang="en-US"/>
           </a:p>
@@ -4285,7 +4285,7 @@
           <a:p>
             <a:fld id="{13CAB402-B863-4AA4-B7CA-C5BADD25EDE0}" type="datetimeFigureOut">
               <a:rPr lang="en-US" smtClean="0"/>
-              <a:t>3/26/2023</a:t>
+              <a:t>3/27/2023</a:t>
             </a:fld>
             <a:endParaRPr lang="en-US"/>
           </a:p>
@@ -4411,7 +4411,7 @@
           <a:p>
             <a:fld id="{13CAB402-B863-4AA4-B7CA-C5BADD25EDE0}" type="datetimeFigureOut">
               <a:rPr lang="en-US" smtClean="0"/>
-              <a:t>3/26/2023</a:t>
+              <a:t>3/27/2023</a:t>
             </a:fld>
             <a:endParaRPr lang="en-US"/>
           </a:p>
@@ -4666,7 +4666,7 @@
           <a:p>
             <a:fld id="{13CAB402-B863-4AA4-B7CA-C5BADD25EDE0}" type="datetimeFigureOut">
               <a:rPr lang="en-US" smtClean="0"/>
-              <a:t>3/26/2023</a:t>
+              <a:t>3/27/2023</a:t>
             </a:fld>
             <a:endParaRPr lang="en-US"/>
           </a:p>
@@ -4981,7 +4981,7 @@
           <a:p>
             <a:fld id="{13CAB402-B863-4AA4-B7CA-C5BADD25EDE0}" type="datetimeFigureOut">
               <a:rPr lang="en-US" smtClean="0"/>
-              <a:t>3/26/2023</a:t>
+              <a:t>3/27/2023</a:t>
             </a:fld>
             <a:endParaRPr lang="en-US"/>
           </a:p>
@@ -5332,7 +5332,7 @@
           <a:p>
             <a:fld id="{13CAB402-B863-4AA4-B7CA-C5BADD25EDE0}" type="datetimeFigureOut">
               <a:rPr lang="en-US" smtClean="0"/>
-              <a:t>3/26/2023</a:t>
+              <a:t>3/27/2023</a:t>
             </a:fld>
             <a:endParaRPr lang="en-US"/>
           </a:p>
@@ -6901,6 +6901,21 @@
             </a:r>
           </a:p>
           <a:p>
+            <a:pPr lvl="1"/>
+            <a:r>
+              <a:rPr lang="en-US" dirty="0"/>
+              <a:t>This step </a:t>
+            </a:r>
+            <a:r>
+              <a:rPr lang="en-US"/>
+              <a:t>can be a </a:t>
+            </a:r>
+            <a:r>
+              <a:rPr lang="en-US" dirty="0"/>
+              <a:t>bit difficult for kids.  Give them the hint.</a:t>
+            </a:r>
+          </a:p>
+          <a:p>
             <a:r>
               <a:rPr lang="en-US" dirty="0"/>
               <a:t>Because triangle is the leading number, so it has to be 2 since that is the maximum non-zero value the equation can satisfy.</a:t>
@@ -6915,13 +6930,8 @@
           <a:p>
             <a:r>
               <a:rPr lang="en-US" dirty="0"/>
-              <a:t>Also, the square needs to be either 3 or 8.  And 3 can be eliminated because there are no good values </a:t>
-            </a:r>
-            <a:r>
-              <a:rPr lang="en-US"/>
-              <a:t>for star.</a:t>
-            </a:r>
-            <a:endParaRPr lang="en-US" dirty="0"/>
+              <a:t>Also, the square needs to be either 3 or 8.  And 3 can be eliminated because there are no good values for star.</a:t>
+            </a:r>
           </a:p>
         </p:txBody>
       </p:sp>

</xml_diff>